<commit_message>
Amélioration de la présentation
</commit_message>
<xml_diff>
--- a/Présentation/PresentationClientsComptes-KlettGutierrezVoirolSchneider.pptx
+++ b/Présentation/PresentationClientsComptes-KlettGutierrezVoirolSchneider.pptx
@@ -5,27 +5,28 @@
     <p:sldMasterId id="2147483648" r:id="rId1"/>
   </p:sldMasterIdLst>
   <p:notesMasterIdLst>
-    <p:notesMasterId r:id="rId15"/>
+    <p:notesMasterId r:id="rId16"/>
   </p:notesMasterIdLst>
   <p:sldIdLst>
     <p:sldId id="256" r:id="rId2"/>
     <p:sldId id="257" r:id="rId3"/>
     <p:sldId id="258" r:id="rId4"/>
-    <p:sldId id="259" r:id="rId5"/>
-    <p:sldId id="264" r:id="rId6"/>
-    <p:sldId id="268" r:id="rId7"/>
-    <p:sldId id="261" r:id="rId8"/>
-    <p:sldId id="262" r:id="rId9"/>
-    <p:sldId id="263" r:id="rId10"/>
-    <p:sldId id="265" r:id="rId11"/>
-    <p:sldId id="266" r:id="rId12"/>
-    <p:sldId id="267" r:id="rId13"/>
-    <p:sldId id="260" r:id="rId14"/>
+    <p:sldId id="270" r:id="rId5"/>
+    <p:sldId id="259" r:id="rId6"/>
+    <p:sldId id="264" r:id="rId7"/>
+    <p:sldId id="268" r:id="rId8"/>
+    <p:sldId id="261" r:id="rId9"/>
+    <p:sldId id="262" r:id="rId10"/>
+    <p:sldId id="263" r:id="rId11"/>
+    <p:sldId id="265" r:id="rId12"/>
+    <p:sldId id="266" r:id="rId13"/>
+    <p:sldId id="267" r:id="rId14"/>
+    <p:sldId id="260" r:id="rId15"/>
   </p:sldIdLst>
   <p:sldSz cx="9144000" cy="6858000" type="screen4x3"/>
   <p:notesSz cx="6858000" cy="9144000"/>
   <p:custDataLst>
-    <p:tags r:id="rId16"/>
+    <p:tags r:id="rId17"/>
   </p:custDataLst>
   <p:defaultTextStyle>
     <a:defPPr>
@@ -223,7 +224,7 @@
           <a:p>
             <a:fld id="{67CB570D-21AD-4F3D-82F5-8A96395485A5}" type="datetimeFigureOut">
               <a:rPr lang="fr-CH" smtClean="0"/>
-              <a:t>20.04.2016</a:t>
+              <a:t>26.04.2016</a:t>
             </a:fld>
             <a:endParaRPr lang="fr-CH"/>
           </a:p>
@@ -382,7 +383,7 @@
           <a:p>
             <a:fld id="{8804BC45-8A4C-4708-A213-37DE77044581}" type="slidenum">
               <a:rPr lang="fr-CH" smtClean="0"/>
-              <a:t>‹N°›</a:t>
+              <a:t>‹#›</a:t>
             </a:fld>
             <a:endParaRPr lang="fr-CH"/>
           </a:p>
@@ -2512,7 +2513,6 @@
               <a:rPr lang="fr-CH" sz="1600" dirty="0"/>
               <a:t>Schneider Julien </a:t>
             </a:r>
-            <a:endParaRPr lang="fr-CH" sz="1600" dirty="0"/>
           </a:p>
         </p:txBody>
       </p:sp>
@@ -2799,11 +2799,7 @@
           <a:p>
             <a:r>
               <a:rPr lang="fr-CH" dirty="0" smtClean="0"/>
-              <a:t>Principe de </a:t>
-            </a:r>
-            <a:r>
-              <a:rPr lang="fr-CH" dirty="0" err="1" smtClean="0"/>
-              <a:t>gamification</a:t>
+              <a:t>Maquettes IHM</a:t>
             </a:r>
             <a:endParaRPr lang="fr-CH" dirty="0"/>
           </a:p>
@@ -2824,6 +2820,174 @@
           <a:bodyPr/>
           <a:lstStyle/>
           <a:p>
+            <a:r>
+              <a:rPr lang="fr-CH" dirty="0" smtClean="0"/>
+              <a:t>Page d’accueil:</a:t>
+            </a:r>
+          </a:p>
+          <a:p>
+            <a:endParaRPr lang="fr-CH" dirty="0" smtClean="0"/>
+          </a:p>
+          <a:p>
+            <a:pPr lvl="1"/>
+            <a:endParaRPr lang="fr-CH" dirty="0"/>
+          </a:p>
+        </p:txBody>
+      </p:sp>
+      <p:pic>
+        <p:nvPicPr>
+          <p:cNvPr id="5" name="Image 4"/>
+          <p:cNvPicPr>
+            <a:picLocks noChangeAspect="1"/>
+          </p:cNvPicPr>
+          <p:nvPr/>
+        </p:nvPicPr>
+        <p:blipFill>
+          <a:blip r:embed="rId2">
+            <a:extLst>
+              <a:ext uri="{28A0092B-C50C-407E-A947-70E740481C1C}">
+                <a14:useLocalDpi xmlns:a14="http://schemas.microsoft.com/office/drawing/2010/main" val="0"/>
+              </a:ext>
+            </a:extLst>
+          </a:blip>
+          <a:stretch>
+            <a:fillRect/>
+          </a:stretch>
+        </p:blipFill>
+        <p:spPr>
+          <a:xfrm>
+            <a:off x="971600" y="2492896"/>
+            <a:ext cx="6784566" cy="3618435"/>
+          </a:xfrm>
+          <a:prstGeom prst="rect">
+            <a:avLst/>
+          </a:prstGeom>
+        </p:spPr>
+      </p:pic>
+    </p:spTree>
+    <p:extLst>
+      <p:ext uri="{BB962C8B-B14F-4D97-AF65-F5344CB8AC3E}">
+        <p14:creationId xmlns:p14="http://schemas.microsoft.com/office/powerpoint/2010/main" val="455240279"/>
+      </p:ext>
+    </p:extLst>
+  </p:cSld>
+  <p:clrMapOvr>
+    <a:masterClrMapping/>
+  </p:clrMapOvr>
+  <p:timing>
+    <p:tnLst>
+      <p:par>
+        <p:cTn id="1" dur="indefinite" restart="never" nodeType="tmRoot"/>
+      </p:par>
+    </p:tnLst>
+  </p:timing>
+</p:sld>
+</file>
+
+<file path=ppt/slides/slide11.xml><?xml version="1.0" encoding="utf-8"?>
+<p:sld xmlns:a="http://schemas.openxmlformats.org/drawingml/2006/main" xmlns:r="http://schemas.openxmlformats.org/officeDocument/2006/relationships" xmlns:p="http://schemas.openxmlformats.org/presentationml/2006/main">
+  <p:cSld>
+    <p:spTree>
+      <p:nvGrpSpPr>
+        <p:cNvPr id="1" name=""/>
+        <p:cNvGrpSpPr/>
+        <p:nvPr/>
+      </p:nvGrpSpPr>
+      <p:grpSpPr>
+        <a:xfrm>
+          <a:off x="0" y="0"/>
+          <a:ext cx="0" cy="0"/>
+          <a:chOff x="0" y="0"/>
+          <a:chExt cx="0" cy="0"/>
+        </a:xfrm>
+      </p:grpSpPr>
+      <p:sp>
+        <p:nvSpPr>
+          <p:cNvPr id="2" name="Espace réservé du texte 1"/>
+          <p:cNvSpPr>
+            <a:spLocks noGrp="1"/>
+          </p:cNvSpPr>
+          <p:nvPr>
+            <p:ph type="body" sz="quarter" idx="10"/>
+          </p:nvPr>
+        </p:nvSpPr>
+        <p:spPr/>
+        <p:txBody>
+          <a:bodyPr/>
+          <a:lstStyle/>
+          <a:p>
+            <a:r>
+              <a:rPr lang="fr-CH" dirty="0" smtClean="0"/>
+              <a:t>Principe de </a:t>
+            </a:r>
+            <a:r>
+              <a:rPr lang="fr-CH" dirty="0" err="1" smtClean="0"/>
+              <a:t>gamification</a:t>
+            </a:r>
+            <a:endParaRPr lang="fr-CH" dirty="0"/>
+          </a:p>
+        </p:txBody>
+      </p:sp>
+      <p:sp>
+        <p:nvSpPr>
+          <p:cNvPr id="3" name="Espace réservé du texte 2"/>
+          <p:cNvSpPr>
+            <a:spLocks noGrp="1"/>
+          </p:cNvSpPr>
+          <p:nvPr>
+            <p:ph type="body" sz="quarter" idx="11"/>
+          </p:nvPr>
+        </p:nvSpPr>
+        <p:spPr/>
+        <p:txBody>
+          <a:bodyPr/>
+          <a:lstStyle/>
+          <a:p>
+            <a:r>
+              <a:rPr lang="en-US" dirty="0" smtClean="0"/>
+              <a:t>Principe :</a:t>
+            </a:r>
+          </a:p>
+          <a:p>
+            <a:pPr lvl="1"/>
+            <a:r>
+              <a:rPr lang="en-US" dirty="0" err="1" smtClean="0"/>
+              <a:t>Statistiques</a:t>
+            </a:r>
+            <a:endParaRPr lang="en-US" dirty="0" smtClean="0"/>
+          </a:p>
+          <a:p>
+            <a:pPr lvl="2"/>
+            <a:r>
+              <a:rPr lang="en-US" sz="2000" dirty="0" err="1" smtClean="0"/>
+              <a:t>Nombre</a:t>
+            </a:r>
+            <a:r>
+              <a:rPr lang="en-US" sz="2000" dirty="0" smtClean="0"/>
+              <a:t> de transactions</a:t>
+            </a:r>
+          </a:p>
+          <a:p>
+            <a:pPr lvl="2"/>
+            <a:r>
+              <a:rPr lang="en-US" sz="2000" dirty="0" err="1" smtClean="0"/>
+              <a:t>Montants</a:t>
+            </a:r>
+            <a:r>
+              <a:rPr lang="en-US" sz="2000" dirty="0" smtClean="0"/>
+              <a:t> des transactions</a:t>
+            </a:r>
+          </a:p>
+          <a:p>
+            <a:pPr lvl="1"/>
+            <a:r>
+              <a:rPr lang="en-US" dirty="0" err="1" smtClean="0"/>
+              <a:t>Classement</a:t>
+            </a:r>
+            <a:endParaRPr lang="en-US" dirty="0" smtClean="0"/>
+          </a:p>
+          <a:p>
+            <a:pPr lvl="2"/>
             <a:endParaRPr lang="fr-CH" dirty="0"/>
           </a:p>
         </p:txBody>
@@ -2848,7 +3012,7 @@
 </p:sld>
 </file>
 
-<file path=ppt/slides/slide11.xml><?xml version="1.0" encoding="utf-8"?>
+<file path=ppt/slides/slide12.xml><?xml version="1.0" encoding="utf-8"?>
 <p:sld xmlns:a="http://schemas.openxmlformats.org/drawingml/2006/main" xmlns:r="http://schemas.openxmlformats.org/officeDocument/2006/relationships" xmlns:p="http://schemas.openxmlformats.org/presentationml/2006/main">
   <p:cSld>
     <p:spTree>
@@ -2967,7 +3131,7 @@
 </p:sld>
 </file>
 
-<file path=ppt/slides/slide12.xml><?xml version="1.0" encoding="utf-8"?>
+<file path=ppt/slides/slide13.xml><?xml version="1.0" encoding="utf-8"?>
 <p:sld xmlns:a="http://schemas.openxmlformats.org/drawingml/2006/main" xmlns:r="http://schemas.openxmlformats.org/officeDocument/2006/relationships" xmlns:p="http://schemas.openxmlformats.org/presentationml/2006/main">
   <p:cSld>
     <p:spTree>
@@ -3038,8 +3202,20 @@
             <a:pPr lvl="1"/>
             <a:r>
               <a:rPr lang="fr-CH" dirty="0" smtClean="0"/>
-              <a:t>Création IHM</a:t>
-            </a:r>
+              <a:t>Création </a:t>
+            </a:r>
+            <a:r>
+              <a:rPr lang="fr-CH" dirty="0" smtClean="0"/>
+              <a:t>de l’interface de l’application</a:t>
+            </a:r>
+          </a:p>
+          <a:p>
+            <a:pPr lvl="1"/>
+            <a:r>
+              <a:rPr lang="en-US" dirty="0" smtClean="0"/>
+              <a:t>Gamification</a:t>
+            </a:r>
+            <a:endParaRPr lang="fr-CH" dirty="0" smtClean="0"/>
           </a:p>
           <a:p>
             <a:pPr lvl="1"/>
@@ -3088,7 +3264,7 @@
 </p:sld>
 </file>
 
-<file path=ppt/slides/slide13.xml><?xml version="1.0" encoding="utf-8"?>
+<file path=ppt/slides/slide14.xml><?xml version="1.0" encoding="utf-8"?>
 <p:sld xmlns:a="http://schemas.openxmlformats.org/drawingml/2006/main" xmlns:r="http://schemas.openxmlformats.org/officeDocument/2006/relationships" xmlns:p="http://schemas.openxmlformats.org/presentationml/2006/main">
   <p:cSld>
     <p:spTree>
@@ -3642,8 +3818,35 @@
                 <a:ea typeface="Tahoma" panose="020B0604030504040204" pitchFamily="34" charset="0"/>
                 <a:cs typeface="Tahoma" panose="020B0604030504040204" pitchFamily="34" charset="0"/>
               </a:rPr>
-              <a:t>Gestion des transactions bancaires</a:t>
-            </a:r>
+              <a:t>Gestion des transactions </a:t>
+            </a:r>
+            <a:r>
+              <a:rPr lang="fr-CH" sz="2000" dirty="0" smtClean="0">
+                <a:latin typeface="Tahoma" panose="020B0604030504040204" pitchFamily="34" charset="0"/>
+                <a:ea typeface="Tahoma" panose="020B0604030504040204" pitchFamily="34" charset="0"/>
+                <a:cs typeface="Tahoma" panose="020B0604030504040204" pitchFamily="34" charset="0"/>
+              </a:rPr>
+              <a:t>bancaires</a:t>
+            </a:r>
+          </a:p>
+          <a:p>
+            <a:pPr lvl="1">
+              <a:buFont typeface="Arial" panose="020B0604020202020204" pitchFamily="34" charset="0"/>
+              <a:buChar char="•"/>
+            </a:pPr>
+            <a:r>
+              <a:rPr lang="en-US" dirty="0" smtClean="0"/>
+              <a:t>Gamification de </a:t>
+            </a:r>
+            <a:r>
+              <a:rPr lang="en-US" dirty="0" err="1" smtClean="0"/>
+              <a:t>l’application</a:t>
+            </a:r>
+            <a:endParaRPr lang="fr-CH" sz="2000" dirty="0" smtClean="0">
+              <a:latin typeface="Tahoma" panose="020B0604030504040204" pitchFamily="34" charset="0"/>
+              <a:ea typeface="Tahoma" panose="020B0604030504040204" pitchFamily="34" charset="0"/>
+              <a:cs typeface="Tahoma" panose="020B0604030504040204" pitchFamily="34" charset="0"/>
+            </a:endParaRPr>
           </a:p>
           <a:p>
             <a:pPr>
@@ -3680,35 +3883,35 @@
           <a:p>
             <a:r>
               <a:rPr lang="fr-CH" sz="2400" dirty="0" smtClean="0"/>
-              <a:t>Connexion à la base de données ens2</a:t>
+              <a:t>Connexion à la base de données </a:t>
+            </a:r>
+            <a:r>
+              <a:rPr lang="fr-CH" sz="2400" dirty="0" smtClean="0"/>
+              <a:t>ens2</a:t>
             </a:r>
           </a:p>
           <a:p>
             <a:pPr lvl="1"/>
             <a:r>
-              <a:rPr lang="fr-CH" dirty="0"/>
-              <a:t>o</a:t>
-            </a:r>
-            <a:r>
-              <a:rPr lang="fr-CH" sz="2000" dirty="0" smtClean="0">
-                <a:latin typeface="Tahoma" panose="020B0604030504040204" pitchFamily="34" charset="0"/>
-                <a:ea typeface="Tahoma" panose="020B0604030504040204" pitchFamily="34" charset="0"/>
-                <a:cs typeface="Tahoma" panose="020B0604030504040204" pitchFamily="34" charset="0"/>
-              </a:rPr>
-              <a:t>jdbc6.jar</a:t>
-            </a:r>
-            <a:endParaRPr lang="fr-CH" sz="2000" dirty="0">
-              <a:latin typeface="Tahoma" panose="020B0604030504040204" pitchFamily="34" charset="0"/>
-              <a:ea typeface="Tahoma" panose="020B0604030504040204" pitchFamily="34" charset="0"/>
-              <a:cs typeface="Tahoma" panose="020B0604030504040204" pitchFamily="34" charset="0"/>
-            </a:endParaRPr>
+              <a:rPr lang="en-US" sz="2000" dirty="0" err="1" smtClean="0"/>
+              <a:t>Schéma</a:t>
+            </a:r>
+            <a:r>
+              <a:rPr lang="en-US" sz="2000" dirty="0" smtClean="0"/>
+              <a:t> : </a:t>
+            </a:r>
+            <a:r>
+              <a:rPr lang="en-US" sz="2000" dirty="0" err="1" smtClean="0"/>
+              <a:t>boris_klett</a:t>
+            </a:r>
+            <a:endParaRPr lang="fr-CH" sz="2000" dirty="0" smtClean="0"/>
           </a:p>
         </p:txBody>
       </p:sp>
     </p:spTree>
     <p:extLst>
       <p:ext uri="{BB962C8B-B14F-4D97-AF65-F5344CB8AC3E}">
-        <p14:creationId xmlns:p14="http://schemas.microsoft.com/office/powerpoint/2010/main" val="1178970985"/>
+        <p14:creationId xmlns:p14="http://schemas.microsoft.com/office/powerpoint/2010/main" val="861026142"/>
       </p:ext>
     </p:extLst>
   </p:cSld>
@@ -3758,6 +3961,260 @@
           <a:lstStyle/>
           <a:p>
             <a:r>
+              <a:rPr lang="fr-CH" sz="2800" dirty="0" smtClean="0"/>
+              <a:t>Présentation</a:t>
+            </a:r>
+            <a:r>
+              <a:rPr lang="fr-CH" dirty="0" smtClean="0"/>
+              <a:t> de l’application</a:t>
+            </a:r>
+            <a:endParaRPr lang="fr-CH" dirty="0"/>
+          </a:p>
+        </p:txBody>
+      </p:sp>
+      <p:sp>
+        <p:nvSpPr>
+          <p:cNvPr id="3" name="Espace réservé du texte 2"/>
+          <p:cNvSpPr>
+            <a:spLocks noGrp="1"/>
+          </p:cNvSpPr>
+          <p:nvPr>
+            <p:ph type="body" sz="quarter" idx="11"/>
+          </p:nvPr>
+        </p:nvSpPr>
+        <p:spPr/>
+        <p:txBody>
+          <a:bodyPr/>
+          <a:lstStyle/>
+          <a:p>
+            <a:pPr>
+              <a:buFont typeface="Arial" panose="020B0604020202020204" pitchFamily="34" charset="0"/>
+              <a:buChar char="•"/>
+            </a:pPr>
+            <a:r>
+              <a:rPr lang="fr-CH" dirty="0" smtClean="0"/>
+              <a:t>Technologies WEB utilisées :</a:t>
+            </a:r>
+          </a:p>
+          <a:p>
+            <a:pPr lvl="1"/>
+            <a:r>
+              <a:rPr lang="en-US" dirty="0" smtClean="0"/>
+              <a:t>Bootstrap</a:t>
+            </a:r>
+            <a:endParaRPr lang="fr-CH" dirty="0" smtClean="0"/>
+          </a:p>
+          <a:p>
+            <a:pPr lvl="1">
+              <a:buFont typeface="Arial" panose="020B0604020202020204" pitchFamily="34" charset="0"/>
+              <a:buChar char="•"/>
+            </a:pPr>
+            <a:r>
+              <a:rPr lang="fr-CH" dirty="0" smtClean="0"/>
+              <a:t>jQ</a:t>
+            </a:r>
+            <a:r>
+              <a:rPr lang="fr-CH" sz="2000" dirty="0" smtClean="0">
+                <a:latin typeface="Tahoma" panose="020B0604030504040204" pitchFamily="34" charset="0"/>
+                <a:ea typeface="Tahoma" panose="020B0604030504040204" pitchFamily="34" charset="0"/>
+                <a:cs typeface="Tahoma" panose="020B0604030504040204" pitchFamily="34" charset="0"/>
+              </a:rPr>
+              <a:t>uery</a:t>
+            </a:r>
+          </a:p>
+          <a:p>
+            <a:pPr lvl="1">
+              <a:buFont typeface="Arial" panose="020B0604020202020204" pitchFamily="34" charset="0"/>
+              <a:buChar char="•"/>
+            </a:pPr>
+            <a:r>
+              <a:rPr lang="en-US" dirty="0" smtClean="0"/>
+              <a:t>Ajax</a:t>
+            </a:r>
+            <a:endParaRPr lang="fr-CH" sz="2000" dirty="0" smtClean="0">
+              <a:latin typeface="Tahoma" panose="020B0604030504040204" pitchFamily="34" charset="0"/>
+              <a:ea typeface="Tahoma" panose="020B0604030504040204" pitchFamily="34" charset="0"/>
+              <a:cs typeface="Tahoma" panose="020B0604030504040204" pitchFamily="34" charset="0"/>
+            </a:endParaRPr>
+          </a:p>
+        </p:txBody>
+      </p:sp>
+      <p:pic>
+        <p:nvPicPr>
+          <p:cNvPr id="1026" name="Picture 2" descr="https://camo.githubusercontent.com/02ed3f6695f288aedec24c2a329c667281efef5f/687474703a2f2f707265636973696f6e2d736f6674776172652e636f6d2f77702d636f6e74656e742f75706c6f6164732f323031342f30342f6a5175726572792e676966"/>
+          <p:cNvPicPr>
+            <a:picLocks noChangeAspect="1" noChangeArrowheads="1"/>
+          </p:cNvPicPr>
+          <p:nvPr/>
+        </p:nvPicPr>
+        <p:blipFill>
+          <a:blip r:embed="rId2" cstate="print">
+            <a:extLst>
+              <a:ext uri="{28A0092B-C50C-407E-A947-70E740481C1C}">
+                <a14:useLocalDpi xmlns:a14="http://schemas.microsoft.com/office/drawing/2010/main" val="0"/>
+              </a:ext>
+            </a:extLst>
+          </a:blip>
+          <a:srcRect/>
+          <a:stretch>
+            <a:fillRect/>
+          </a:stretch>
+        </p:blipFill>
+        <p:spPr bwMode="auto">
+          <a:xfrm>
+            <a:off x="3639678" y="4427202"/>
+            <a:ext cx="1220354" cy="1220354"/>
+          </a:xfrm>
+          <a:prstGeom prst="rect">
+            <a:avLst/>
+          </a:prstGeom>
+          <a:noFill/>
+          <a:extLst>
+            <a:ext uri="{909E8E84-426E-40DD-AFC4-6F175D3DCCD1}">
+              <a14:hiddenFill xmlns:a14="http://schemas.microsoft.com/office/drawing/2010/main">
+                <a:solidFill>
+                  <a:srgbClr val="FFFFFF"/>
+                </a:solidFill>
+              </a14:hiddenFill>
+            </a:ext>
+          </a:extLst>
+        </p:spPr>
+      </p:pic>
+      <p:pic>
+        <p:nvPicPr>
+          <p:cNvPr id="1028" name="Picture 4" descr="http://bmdm.com/wp-content/uploads/bootstrap.png"/>
+          <p:cNvPicPr>
+            <a:picLocks noChangeAspect="1" noChangeArrowheads="1"/>
+          </p:cNvPicPr>
+          <p:nvPr/>
+        </p:nvPicPr>
+        <p:blipFill>
+          <a:blip r:embed="rId3">
+            <a:extLst>
+              <a:ext uri="{28A0092B-C50C-407E-A947-70E740481C1C}">
+                <a14:useLocalDpi xmlns:a14="http://schemas.microsoft.com/office/drawing/2010/main" val="0"/>
+              </a:ext>
+            </a:extLst>
+          </a:blip>
+          <a:srcRect/>
+          <a:stretch>
+            <a:fillRect/>
+          </a:stretch>
+        </p:blipFill>
+        <p:spPr bwMode="auto">
+          <a:xfrm>
+            <a:off x="539552" y="4468375"/>
+            <a:ext cx="2466611" cy="1138436"/>
+          </a:xfrm>
+          <a:prstGeom prst="rect">
+            <a:avLst/>
+          </a:prstGeom>
+          <a:noFill/>
+          <a:extLst>
+            <a:ext uri="{909E8E84-426E-40DD-AFC4-6F175D3DCCD1}">
+              <a14:hiddenFill xmlns:a14="http://schemas.microsoft.com/office/drawing/2010/main">
+                <a:solidFill>
+                  <a:srgbClr val="FFFFFF"/>
+                </a:solidFill>
+              </a14:hiddenFill>
+            </a:ext>
+          </a:extLst>
+        </p:spPr>
+      </p:pic>
+      <p:pic>
+        <p:nvPicPr>
+          <p:cNvPr id="1030" name="Picture 6" descr="https://upload.wikimedia.org/wikipedia/commons/thumb/a/a1/AJAX_logo_by_gengns.svg/2000px-AJAX_logo_by_gengns.svg.png"/>
+          <p:cNvPicPr>
+            <a:picLocks noChangeAspect="1" noChangeArrowheads="1"/>
+          </p:cNvPicPr>
+          <p:nvPr/>
+        </p:nvPicPr>
+        <p:blipFill>
+          <a:blip r:embed="rId4" cstate="print">
+            <a:extLst>
+              <a:ext uri="{28A0092B-C50C-407E-A947-70E740481C1C}">
+                <a14:useLocalDpi xmlns:a14="http://schemas.microsoft.com/office/drawing/2010/main" val="0"/>
+              </a:ext>
+            </a:extLst>
+          </a:blip>
+          <a:srcRect/>
+          <a:stretch>
+            <a:fillRect/>
+          </a:stretch>
+        </p:blipFill>
+        <p:spPr bwMode="auto">
+          <a:xfrm>
+            <a:off x="5652120" y="4484812"/>
+            <a:ext cx="2304256" cy="1105133"/>
+          </a:xfrm>
+          <a:prstGeom prst="rect">
+            <a:avLst/>
+          </a:prstGeom>
+          <a:noFill/>
+          <a:extLst>
+            <a:ext uri="{909E8E84-426E-40DD-AFC4-6F175D3DCCD1}">
+              <a14:hiddenFill xmlns:a14="http://schemas.microsoft.com/office/drawing/2010/main">
+                <a:solidFill>
+                  <a:srgbClr val="FFFFFF"/>
+                </a:solidFill>
+              </a14:hiddenFill>
+            </a:ext>
+          </a:extLst>
+        </p:spPr>
+      </p:pic>
+    </p:spTree>
+    <p:extLst>
+      <p:ext uri="{BB962C8B-B14F-4D97-AF65-F5344CB8AC3E}">
+        <p14:creationId xmlns:p14="http://schemas.microsoft.com/office/powerpoint/2010/main" val="1178970985"/>
+      </p:ext>
+    </p:extLst>
+  </p:cSld>
+  <p:clrMapOvr>
+    <a:masterClrMapping/>
+  </p:clrMapOvr>
+  <p:timing>
+    <p:tnLst>
+      <p:par>
+        <p:cTn id="1" dur="indefinite" restart="never" nodeType="tmRoot"/>
+      </p:par>
+    </p:tnLst>
+  </p:timing>
+</p:sld>
+</file>
+
+<file path=ppt/slides/slide6.xml><?xml version="1.0" encoding="utf-8"?>
+<p:sld xmlns:a="http://schemas.openxmlformats.org/drawingml/2006/main" xmlns:r="http://schemas.openxmlformats.org/officeDocument/2006/relationships" xmlns:p="http://schemas.openxmlformats.org/presentationml/2006/main">
+  <p:cSld>
+    <p:spTree>
+      <p:nvGrpSpPr>
+        <p:cNvPr id="1" name=""/>
+        <p:cNvGrpSpPr/>
+        <p:nvPr/>
+      </p:nvGrpSpPr>
+      <p:grpSpPr>
+        <a:xfrm>
+          <a:off x="0" y="0"/>
+          <a:ext cx="0" cy="0"/>
+          <a:chOff x="0" y="0"/>
+          <a:chExt cx="0" cy="0"/>
+        </a:xfrm>
+      </p:grpSpPr>
+      <p:sp>
+        <p:nvSpPr>
+          <p:cNvPr id="2" name="Espace réservé du texte 1"/>
+          <p:cNvSpPr>
+            <a:spLocks noGrp="1"/>
+          </p:cNvSpPr>
+          <p:nvPr>
+            <p:ph type="body" sz="quarter" idx="10"/>
+          </p:nvPr>
+        </p:nvSpPr>
+        <p:spPr/>
+        <p:txBody>
+          <a:bodyPr/>
+          <a:lstStyle/>
+          <a:p>
+            <a:r>
               <a:rPr lang="fr-CH" dirty="0" smtClean="0"/>
               <a:t>Structure du Code</a:t>
             </a:r>
@@ -3828,7 +4285,7 @@
 </p:sld>
 </file>
 
-<file path=ppt/slides/slide6.xml><?xml version="1.0" encoding="utf-8"?>
+<file path=ppt/slides/slide7.xml><?xml version="1.0" encoding="utf-8"?>
 <p:sld xmlns:a="http://schemas.openxmlformats.org/drawingml/2006/main" xmlns:r="http://schemas.openxmlformats.org/officeDocument/2006/relationships" xmlns:p="http://schemas.openxmlformats.org/presentationml/2006/main">
   <p:cSld>
     <p:spTree>
@@ -3935,7 +4392,7 @@
 </p:sld>
 </file>
 
-<file path=ppt/slides/slide7.xml><?xml version="1.0" encoding="utf-8"?>
+<file path=ppt/slides/slide8.xml><?xml version="1.0" encoding="utf-8"?>
 <p:sld xmlns:a="http://schemas.openxmlformats.org/drawingml/2006/main" xmlns:r="http://schemas.openxmlformats.org/officeDocument/2006/relationships" xmlns:p="http://schemas.openxmlformats.org/presentationml/2006/main">
   <p:cSld>
     <p:spTree>
@@ -3991,12 +4448,8 @@
           <a:lstStyle/>
           <a:p>
             <a:r>
-              <a:rPr lang="fr-CH" smtClean="0"/>
-              <a:t>Maquettes réalisées </a:t>
-            </a:r>
-            <a:r>
-              <a:rPr lang="fr-CH" dirty="0" smtClean="0"/>
-              <a:t>avec </a:t>
+              <a:rPr lang="fr-CH" dirty="0" smtClean="0"/>
+              <a:t>Maquettes réalisées avec </a:t>
             </a:r>
             <a:r>
               <a:rPr lang="fr-CH" dirty="0" err="1" smtClean="0"/>
@@ -4005,39 +4458,74 @@
             <a:endParaRPr lang="fr-CH" dirty="0" smtClean="0"/>
           </a:p>
           <a:p>
+            <a:endParaRPr lang="en-US" dirty="0"/>
+          </a:p>
+          <a:p>
+            <a:r>
+              <a:rPr lang="en-US" dirty="0"/>
+              <a:t>Bon </a:t>
+            </a:r>
+            <a:r>
+              <a:rPr lang="en-US" dirty="0" err="1"/>
+              <a:t>outil</a:t>
+            </a:r>
+            <a:r>
+              <a:rPr lang="en-US" dirty="0"/>
+              <a:t> de </a:t>
+            </a:r>
+            <a:r>
+              <a:rPr lang="en-US" dirty="0" smtClean="0"/>
+              <a:t>communication</a:t>
+            </a:r>
+          </a:p>
+          <a:p>
+            <a:endParaRPr lang="fr-CH" dirty="0"/>
+          </a:p>
+          <a:p>
+            <a:r>
+              <a:rPr lang="en-US" dirty="0" err="1" smtClean="0"/>
+              <a:t>Listes</a:t>
+            </a:r>
+            <a:r>
+              <a:rPr lang="en-US" dirty="0" smtClean="0"/>
+              <a:t> des </a:t>
+            </a:r>
+            <a:r>
+              <a:rPr lang="en-US" dirty="0" err="1" smtClean="0"/>
+              <a:t>maquettes</a:t>
+            </a:r>
+            <a:r>
+              <a:rPr lang="en-US" dirty="0" smtClean="0"/>
+              <a:t> :</a:t>
+            </a:r>
+          </a:p>
+          <a:p>
             <a:pPr lvl="1"/>
             <a:r>
-              <a:rPr lang="fr-CH" dirty="0" smtClean="0"/>
-              <a:t>Application locale</a:t>
-            </a:r>
+              <a:rPr lang="en-US" dirty="0" smtClean="0"/>
+              <a:t>Plan du site</a:t>
+            </a:r>
+            <a:endParaRPr lang="en-US" dirty="0"/>
           </a:p>
           <a:p>
             <a:pPr lvl="1"/>
+            <a:r>
+              <a:rPr lang="en-US" dirty="0" smtClean="0"/>
+              <a:t>1 </a:t>
+            </a:r>
+            <a:r>
+              <a:rPr lang="en-US" dirty="0" err="1" smtClean="0"/>
+              <a:t>maquette</a:t>
+            </a:r>
+            <a:r>
+              <a:rPr lang="en-US" dirty="0" smtClean="0"/>
+              <a:t> par page de </a:t>
+            </a:r>
+            <a:r>
+              <a:rPr lang="en-US" dirty="0" err="1" smtClean="0"/>
+              <a:t>l’application</a:t>
+            </a:r>
             <a:endParaRPr lang="fr-CH" dirty="0" smtClean="0"/>
-          </a:p>
-          <a:p>
-            <a:r>
-              <a:rPr lang="fr-CH" dirty="0" smtClean="0"/>
-              <a:t>Exports</a:t>
-            </a:r>
-          </a:p>
-          <a:p>
-            <a:pPr lvl="1"/>
-            <a:r>
-              <a:rPr lang="fr-CH" dirty="0" smtClean="0"/>
-              <a:t>PNG</a:t>
-            </a:r>
-          </a:p>
-          <a:p>
-            <a:pPr lvl="1"/>
-            <a:r>
-              <a:rPr lang="fr-CH" dirty="0" smtClean="0"/>
-              <a:t>PDF</a:t>
-            </a:r>
-          </a:p>
-          <a:p>
-            <a:pPr lvl="1"/>
-            <a:endParaRPr lang="fr-CH" dirty="0"/>
           </a:p>
         </p:txBody>
       </p:sp>
@@ -4061,7 +4549,7 @@
 </p:sld>
 </file>
 
-<file path=ppt/slides/slide8.xml><?xml version="1.0" encoding="utf-8"?>
+<file path=ppt/slides/slide9.xml><?xml version="1.0" encoding="utf-8"?>
 <p:sld xmlns:a="http://schemas.openxmlformats.org/drawingml/2006/main" xmlns:r="http://schemas.openxmlformats.org/officeDocument/2006/relationships" xmlns:p="http://schemas.openxmlformats.org/presentationml/2006/main">
   <p:cSld>
     <p:spTree>
@@ -4164,125 +4652,6 @@
     <p:extLst>
       <p:ext uri="{BB962C8B-B14F-4D97-AF65-F5344CB8AC3E}">
         <p14:creationId xmlns:p14="http://schemas.microsoft.com/office/powerpoint/2010/main" val="190863230"/>
-      </p:ext>
-    </p:extLst>
-  </p:cSld>
-  <p:clrMapOvr>
-    <a:masterClrMapping/>
-  </p:clrMapOvr>
-  <p:timing>
-    <p:tnLst>
-      <p:par>
-        <p:cTn id="1" dur="indefinite" restart="never" nodeType="tmRoot"/>
-      </p:par>
-    </p:tnLst>
-  </p:timing>
-</p:sld>
-</file>
-
-<file path=ppt/slides/slide9.xml><?xml version="1.0" encoding="utf-8"?>
-<p:sld xmlns:a="http://schemas.openxmlformats.org/drawingml/2006/main" xmlns:r="http://schemas.openxmlformats.org/officeDocument/2006/relationships" xmlns:p="http://schemas.openxmlformats.org/presentationml/2006/main">
-  <p:cSld>
-    <p:spTree>
-      <p:nvGrpSpPr>
-        <p:cNvPr id="1" name=""/>
-        <p:cNvGrpSpPr/>
-        <p:nvPr/>
-      </p:nvGrpSpPr>
-      <p:grpSpPr>
-        <a:xfrm>
-          <a:off x="0" y="0"/>
-          <a:ext cx="0" cy="0"/>
-          <a:chOff x="0" y="0"/>
-          <a:chExt cx="0" cy="0"/>
-        </a:xfrm>
-      </p:grpSpPr>
-      <p:sp>
-        <p:nvSpPr>
-          <p:cNvPr id="2" name="Espace réservé du texte 1"/>
-          <p:cNvSpPr>
-            <a:spLocks noGrp="1"/>
-          </p:cNvSpPr>
-          <p:nvPr>
-            <p:ph type="body" sz="quarter" idx="10"/>
-          </p:nvPr>
-        </p:nvSpPr>
-        <p:spPr/>
-        <p:txBody>
-          <a:bodyPr/>
-          <a:lstStyle/>
-          <a:p>
-            <a:r>
-              <a:rPr lang="fr-CH" dirty="0" smtClean="0"/>
-              <a:t>Maquettes IHM</a:t>
-            </a:r>
-            <a:endParaRPr lang="fr-CH" dirty="0"/>
-          </a:p>
-        </p:txBody>
-      </p:sp>
-      <p:sp>
-        <p:nvSpPr>
-          <p:cNvPr id="3" name="Espace réservé du texte 2"/>
-          <p:cNvSpPr>
-            <a:spLocks noGrp="1"/>
-          </p:cNvSpPr>
-          <p:nvPr>
-            <p:ph type="body" sz="quarter" idx="11"/>
-          </p:nvPr>
-        </p:nvSpPr>
-        <p:spPr/>
-        <p:txBody>
-          <a:bodyPr/>
-          <a:lstStyle/>
-          <a:p>
-            <a:r>
-              <a:rPr lang="fr-CH" dirty="0" smtClean="0"/>
-              <a:t>Page d’accueil:</a:t>
-            </a:r>
-          </a:p>
-          <a:p>
-            <a:endParaRPr lang="fr-CH" dirty="0" smtClean="0"/>
-          </a:p>
-          <a:p>
-            <a:pPr lvl="1"/>
-            <a:endParaRPr lang="fr-CH" dirty="0"/>
-          </a:p>
-        </p:txBody>
-      </p:sp>
-      <p:pic>
-        <p:nvPicPr>
-          <p:cNvPr id="5" name="Image 4"/>
-          <p:cNvPicPr>
-            <a:picLocks noChangeAspect="1"/>
-          </p:cNvPicPr>
-          <p:nvPr/>
-        </p:nvPicPr>
-        <p:blipFill>
-          <a:blip r:embed="rId2">
-            <a:extLst>
-              <a:ext uri="{28A0092B-C50C-407E-A947-70E740481C1C}">
-                <a14:useLocalDpi xmlns:a14="http://schemas.microsoft.com/office/drawing/2010/main" val="0"/>
-              </a:ext>
-            </a:extLst>
-          </a:blip>
-          <a:stretch>
-            <a:fillRect/>
-          </a:stretch>
-        </p:blipFill>
-        <p:spPr>
-          <a:xfrm>
-            <a:off x="971600" y="2492896"/>
-            <a:ext cx="6784566" cy="3618435"/>
-          </a:xfrm>
-          <a:prstGeom prst="rect">
-            <a:avLst/>
-          </a:prstGeom>
-        </p:spPr>
-      </p:pic>
-    </p:spTree>
-    <p:extLst>
-      <p:ext uri="{BB962C8B-B14F-4D97-AF65-F5344CB8AC3E}">
-        <p14:creationId xmlns:p14="http://schemas.microsoft.com/office/powerpoint/2010/main" val="455240279"/>
       </p:ext>
     </p:extLst>
   </p:cSld>

</xml_diff>